<commit_message>
Adding circle gesture and screen tap
</commit_message>
<xml_diff>
--- a/presentation.pptx
+++ b/presentation.pptx
@@ -1,6 +1,6 @@
 
 <file path=ppt/presentation.xml><?xml version="1.0" encoding="utf-8"?>
-<p:presentation xmlns:a="http://schemas.openxmlformats.org/drawingml/2006/main" xmlns:r="http://schemas.openxmlformats.org/officeDocument/2006/relationships" xmlns:p="http://schemas.openxmlformats.org/presentationml/2006/main" autoCompressPictures="0">
+<p:presentation xmlns:a="http://schemas.openxmlformats.org/drawingml/2006/main" xmlns:r="http://schemas.openxmlformats.org/officeDocument/2006/relationships" xmlns:p="http://schemas.openxmlformats.org/presentationml/2006/main" saveSubsetFonts="1" autoCompressPictures="0">
   <p:sldMasterIdLst>
     <p:sldMasterId id="2147483648" r:id="rId1"/>
   </p:sldMasterIdLst>
@@ -8,10 +8,11 @@
     <p:sldId id="256" r:id="rId2"/>
     <p:sldId id="257" r:id="rId3"/>
     <p:sldId id="258" r:id="rId4"/>
-    <p:sldId id="262" r:id="rId5"/>
-    <p:sldId id="259" r:id="rId6"/>
-    <p:sldId id="260" r:id="rId7"/>
-    <p:sldId id="261" r:id="rId8"/>
+    <p:sldId id="263" r:id="rId5"/>
+    <p:sldId id="262" r:id="rId6"/>
+    <p:sldId id="259" r:id="rId7"/>
+    <p:sldId id="260" r:id="rId8"/>
+    <p:sldId id="261" r:id="rId9"/>
   </p:sldIdLst>
   <p:sldSz cx="12192000" cy="6858000"/>
   <p:notesSz cx="6858000" cy="9144000"/>
@@ -110,6 +111,11 @@
       </a:defRPr>
     </a:lvl9pPr>
   </p:defaultTextStyle>
+  <p:extLst>
+    <p:ext uri="{EFAFB233-063F-42B5-8137-9DF3F51BA10A}">
+      <p15:sldGuideLst xmlns:p15="http://schemas.microsoft.com/office/powerpoint/2012/main"/>
+    </p:ext>
+  </p:extLst>
 </p:presentation>
 </file>
 
@@ -299,7 +305,7 @@
           <a:p>
             <a:fld id="{4AAD347D-5ACD-4C99-B74B-A9C85AD731AF}" type="datetimeFigureOut">
               <a:rPr lang="en-US" dirty="0"/>
-              <a:t>4/4/2019</a:t>
+              <a:t>4/4/19</a:t>
             </a:fld>
             <a:endParaRPr lang="en-US" dirty="0"/>
           </a:p>
@@ -569,7 +575,7 @@
           <a:p>
             <a:fld id="{4509A250-FF31-4206-8172-F9D3106AACB1}" type="datetimeFigureOut">
               <a:rPr lang="en-US" dirty="0"/>
-              <a:t>4/4/2019</a:t>
+              <a:t>4/4/19</a:t>
             </a:fld>
             <a:endParaRPr lang="en-US" dirty="0"/>
           </a:p>
@@ -758,7 +764,7 @@
           <a:p>
             <a:fld id="{4509A250-FF31-4206-8172-F9D3106AACB1}" type="datetimeFigureOut">
               <a:rPr lang="en-US" dirty="0"/>
-              <a:t>4/4/2019</a:t>
+              <a:t>4/4/19</a:t>
             </a:fld>
             <a:endParaRPr lang="en-US" dirty="0"/>
           </a:p>
@@ -1026,7 +1032,7 @@
           <a:p>
             <a:fld id="{4509A250-FF31-4206-8172-F9D3106AACB1}" type="datetimeFigureOut">
               <a:rPr lang="en-US" dirty="0"/>
-              <a:t>4/4/2019</a:t>
+              <a:t>4/4/19</a:t>
             </a:fld>
             <a:endParaRPr lang="en-US" dirty="0"/>
           </a:p>
@@ -1362,7 +1368,7 @@
           <a:p>
             <a:fld id="{4509A250-FF31-4206-8172-F9D3106AACB1}" type="datetimeFigureOut">
               <a:rPr lang="en-US" dirty="0"/>
-              <a:t>4/4/2019</a:t>
+              <a:t>4/4/19</a:t>
             </a:fld>
             <a:endParaRPr lang="en-US" dirty="0"/>
           </a:p>
@@ -1980,7 +1986,7 @@
           <a:p>
             <a:fld id="{4509A250-FF31-4206-8172-F9D3106AACB1}" type="datetimeFigureOut">
               <a:rPr lang="en-US" dirty="0"/>
-              <a:t>4/4/2019</a:t>
+              <a:t>4/4/19</a:t>
             </a:fld>
             <a:endParaRPr lang="en-US" dirty="0"/>
           </a:p>
@@ -2835,7 +2841,7 @@
           <a:p>
             <a:fld id="{4509A250-FF31-4206-8172-F9D3106AACB1}" type="datetimeFigureOut">
               <a:rPr lang="en-US" dirty="0"/>
-              <a:t>4/4/2019</a:t>
+              <a:t>4/4/19</a:t>
             </a:fld>
             <a:endParaRPr lang="en-US" dirty="0"/>
           </a:p>
@@ -3000,7 +3006,7 @@
           <a:p>
             <a:fld id="{4509A250-FF31-4206-8172-F9D3106AACB1}" type="datetimeFigureOut">
               <a:rPr lang="en-US" dirty="0"/>
-              <a:t>4/4/2019</a:t>
+              <a:t>4/4/19</a:t>
             </a:fld>
             <a:endParaRPr lang="en-US" dirty="0"/>
           </a:p>
@@ -3175,7 +3181,7 @@
           <a:p>
             <a:fld id="{4509A250-FF31-4206-8172-F9D3106AACB1}" type="datetimeFigureOut">
               <a:rPr lang="en-US" dirty="0"/>
-              <a:t>4/4/2019</a:t>
+              <a:t>4/4/19</a:t>
             </a:fld>
             <a:endParaRPr lang="en-US" dirty="0"/>
           </a:p>
@@ -3340,7 +3346,7 @@
           <a:p>
             <a:fld id="{4509A250-FF31-4206-8172-F9D3106AACB1}" type="datetimeFigureOut">
               <a:rPr lang="en-US" dirty="0"/>
-              <a:t>4/4/2019</a:t>
+              <a:t>4/4/19</a:t>
             </a:fld>
             <a:endParaRPr lang="en-US" dirty="0"/>
           </a:p>
@@ -3582,7 +3588,7 @@
           <a:p>
             <a:fld id="{9796027F-7875-4030-9381-8BD8C4F21935}" type="datetimeFigureOut">
               <a:rPr lang="en-US" dirty="0"/>
-              <a:t>4/4/2019</a:t>
+              <a:t>4/4/19</a:t>
             </a:fld>
             <a:endParaRPr lang="en-US" dirty="0"/>
           </a:p>
@@ -3869,7 +3875,7 @@
           <a:p>
             <a:fld id="{9796027F-7875-4030-9381-8BD8C4F21935}" type="datetimeFigureOut">
               <a:rPr lang="en-US" dirty="0"/>
-              <a:t>4/4/2019</a:t>
+              <a:t>4/4/19</a:t>
             </a:fld>
             <a:endParaRPr lang="en-US" dirty="0"/>
           </a:p>
@@ -4308,7 +4314,7 @@
           <a:p>
             <a:fld id="{9796027F-7875-4030-9381-8BD8C4F21935}" type="datetimeFigureOut">
               <a:rPr lang="en-US" dirty="0"/>
-              <a:t>4/4/2019</a:t>
+              <a:t>4/4/19</a:t>
             </a:fld>
             <a:endParaRPr lang="en-US" dirty="0"/>
           </a:p>
@@ -4421,7 +4427,7 @@
           <a:p>
             <a:fld id="{4509A250-FF31-4206-8172-F9D3106AACB1}" type="datetimeFigureOut">
               <a:rPr lang="en-US" dirty="0"/>
-              <a:t>4/4/2019</a:t>
+              <a:t>4/4/19</a:t>
             </a:fld>
             <a:endParaRPr lang="en-US" dirty="0"/>
           </a:p>
@@ -4511,7 +4517,7 @@
           <a:p>
             <a:fld id="{4509A250-FF31-4206-8172-F9D3106AACB1}" type="datetimeFigureOut">
               <a:rPr lang="en-US" dirty="0"/>
-              <a:t>4/4/2019</a:t>
+              <a:t>4/4/19</a:t>
             </a:fld>
             <a:endParaRPr lang="en-US" dirty="0"/>
           </a:p>
@@ -4785,7 +4791,7 @@
           <a:p>
             <a:fld id="{4509A250-FF31-4206-8172-F9D3106AACB1}" type="datetimeFigureOut">
               <a:rPr lang="en-US" dirty="0"/>
-              <a:t>4/4/2019</a:t>
+              <a:t>4/4/19</a:t>
             </a:fld>
             <a:endParaRPr lang="en-US" dirty="0"/>
           </a:p>
@@ -5055,7 +5061,7 @@
           <a:p>
             <a:fld id="{4509A250-FF31-4206-8172-F9D3106AACB1}" type="datetimeFigureOut">
               <a:rPr lang="en-US" dirty="0"/>
-              <a:t>4/4/2019</a:t>
+              <a:t>4/4/19</a:t>
             </a:fld>
             <a:endParaRPr lang="en-US" dirty="0"/>
           </a:p>
@@ -5479,7 +5485,7 @@
           <a:p>
             <a:fld id="{4AAD347D-5ACD-4C99-B74B-A9C85AD731AF}" type="datetimeFigureOut">
               <a:rPr lang="en-US" dirty="0"/>
-              <a:t>4/4/2019</a:t>
+              <a:t>4/4/19</a:t>
             </a:fld>
             <a:endParaRPr lang="en-US" dirty="0"/>
           </a:p>
@@ -6008,7 +6014,7 @@
           <p:cNvPr id="2" name="Title 1">
             <a:extLst>
               <a:ext uri="{FF2B5EF4-FFF2-40B4-BE49-F238E27FC236}">
-                <a16:creationId xmlns:a16="http://schemas.microsoft.com/office/drawing/2014/main" id="{3CE16BCE-57B5-4AC6-BD9D-0AF15055A2B9}"/>
+                <a16:creationId xmlns:a16="http://schemas.microsoft.com/office/drawing/2014/main" xmlns="" id="{3CE16BCE-57B5-4AC6-BD9D-0AF15055A2B9}"/>
               </a:ext>
             </a:extLst>
           </p:cNvPr>
@@ -6042,7 +6048,7 @@
           <p:cNvPr id="3" name="Subtitle 2">
             <a:extLst>
               <a:ext uri="{FF2B5EF4-FFF2-40B4-BE49-F238E27FC236}">
-                <a16:creationId xmlns:a16="http://schemas.microsoft.com/office/drawing/2014/main" id="{BACC0270-3096-45B2-8CB4-191D724C5D82}"/>
+                <a16:creationId xmlns:a16="http://schemas.microsoft.com/office/drawing/2014/main" xmlns="" id="{BACC0270-3096-45B2-8CB4-191D724C5D82}"/>
               </a:ext>
             </a:extLst>
           </p:cNvPr>
@@ -6115,7 +6121,7 @@
           <p:cNvPr id="2" name="Title 1">
             <a:extLst>
               <a:ext uri="{FF2B5EF4-FFF2-40B4-BE49-F238E27FC236}">
-                <a16:creationId xmlns:a16="http://schemas.microsoft.com/office/drawing/2014/main" id="{4D64A5DB-1ED7-44C5-8A92-74E81ABAC86B}"/>
+                <a16:creationId xmlns:a16="http://schemas.microsoft.com/office/drawing/2014/main" xmlns="" id="{4D64A5DB-1ED7-44C5-8A92-74E81ABAC86B}"/>
               </a:ext>
             </a:extLst>
           </p:cNvPr>
@@ -6144,7 +6150,7 @@
           <p:cNvPr id="3" name="Content Placeholder 2">
             <a:extLst>
               <a:ext uri="{FF2B5EF4-FFF2-40B4-BE49-F238E27FC236}">
-                <a16:creationId xmlns:a16="http://schemas.microsoft.com/office/drawing/2014/main" id="{546C9FA6-2423-4937-80D0-6B53006A6177}"/>
+                <a16:creationId xmlns:a16="http://schemas.microsoft.com/office/drawing/2014/main" xmlns="" id="{546C9FA6-2423-4937-80D0-6B53006A6177}"/>
               </a:ext>
             </a:extLst>
           </p:cNvPr>
@@ -6213,7 +6219,7 @@
           <p:cNvPr id="2" name="Title 1">
             <a:extLst>
               <a:ext uri="{FF2B5EF4-FFF2-40B4-BE49-F238E27FC236}">
-                <a16:creationId xmlns:a16="http://schemas.microsoft.com/office/drawing/2014/main" id="{17E433F8-4BC7-4D70-9AAB-202787C16851}"/>
+                <a16:creationId xmlns:a16="http://schemas.microsoft.com/office/drawing/2014/main" xmlns="" id="{17E433F8-4BC7-4D70-9AAB-202787C16851}"/>
               </a:ext>
             </a:extLst>
           </p:cNvPr>
@@ -6242,7 +6248,7 @@
           <p:cNvPr id="3" name="Content Placeholder 2">
             <a:extLst>
               <a:ext uri="{FF2B5EF4-FFF2-40B4-BE49-F238E27FC236}">
-                <a16:creationId xmlns:a16="http://schemas.microsoft.com/office/drawing/2014/main" id="{17E30B58-209E-4F0E-9BEE-97C7CF980557}"/>
+                <a16:creationId xmlns:a16="http://schemas.microsoft.com/office/drawing/2014/main" xmlns="" id="{17E30B58-209E-4F0E-9BEE-97C7CF980557}"/>
               </a:ext>
             </a:extLst>
           </p:cNvPr>
@@ -6273,6 +6279,22 @@
               <a:rPr lang="en-US" sz="4000" dirty="0"/>
               <a:t>Leap Motion </a:t>
             </a:r>
+            <a:endParaRPr lang="en-US" sz="4000" dirty="0"/>
+          </a:p>
+          <a:p>
+            <a:r>
+              <a:rPr lang="en-US" sz="4000" dirty="0" smtClean="0"/>
+              <a:t>Leap Motion SDK (</a:t>
+            </a:r>
+            <a:r>
+              <a:rPr lang="en-US" sz="4000" dirty="0" err="1" smtClean="0"/>
+              <a:t>macOS</a:t>
+            </a:r>
+            <a:r>
+              <a:rPr lang="en-US" sz="4000" dirty="0" smtClean="0"/>
+              <a:t>/Windows)</a:t>
+            </a:r>
+            <a:endParaRPr lang="en-US" sz="4000" dirty="0"/>
           </a:p>
           <a:p>
             <a:r>
@@ -6284,10 +6306,9 @@
               <a:t>Lejos</a:t>
             </a:r>
             <a:r>
-              <a:rPr lang="en-US" sz="4000" dirty="0"/>
+              <a:rPr lang="en-US" sz="4000" dirty="0" smtClean="0"/>
               <a:t>)</a:t>
             </a:r>
-            <a:endParaRPr lang="en-IE" sz="4000" dirty="0"/>
           </a:p>
         </p:txBody>
       </p:sp>
@@ -6321,100 +6342,40 @@
           <a:chExt cx="0" cy="0"/>
         </a:xfrm>
       </p:grpSpPr>
-      <p:sp>
-        <p:nvSpPr>
-          <p:cNvPr id="2" name="Title 1">
+      <p:pic>
+        <p:nvPicPr>
+          <p:cNvPr id="4" name="Picture 3"/>
+          <p:cNvPicPr>
+            <a:picLocks noChangeAspect="1"/>
+          </p:cNvPicPr>
+          <p:nvPr/>
+        </p:nvPicPr>
+        <p:blipFill>
+          <a:blip r:embed="rId2">
             <a:extLst>
-              <a:ext uri="{FF2B5EF4-FFF2-40B4-BE49-F238E27FC236}">
-                <a16:creationId xmlns:a16="http://schemas.microsoft.com/office/drawing/2014/main" id="{102572C9-9C34-4253-8C28-01233DB3741E}"/>
+              <a:ext uri="{28A0092B-C50C-407E-A947-70E740481C1C}">
+                <a14:useLocalDpi xmlns:a14="http://schemas.microsoft.com/office/drawing/2010/main" val="0"/>
               </a:ext>
             </a:extLst>
-          </p:cNvPr>
-          <p:cNvSpPr>
-            <a:spLocks noGrp="1"/>
-          </p:cNvSpPr>
-          <p:nvPr>
-            <p:ph type="title"/>
-          </p:nvPr>
-        </p:nvSpPr>
-        <p:spPr/>
-        <p:txBody>
-          <a:bodyPr/>
-          <a:lstStyle/>
-          <a:p>
-            <a:r>
-              <a:rPr lang="en-IE" dirty="0"/>
-              <a:t>Mechanical</a:t>
-            </a:r>
-            <a:r>
-              <a:rPr lang="en-US" dirty="0"/>
-              <a:t> Arm Setup</a:t>
-            </a:r>
-            <a:endParaRPr lang="en-IE" dirty="0"/>
-          </a:p>
-        </p:txBody>
-      </p:sp>
-      <p:sp>
-        <p:nvSpPr>
-          <p:cNvPr id="3" name="Content Placeholder 2">
-            <a:extLst>
-              <a:ext uri="{FF2B5EF4-FFF2-40B4-BE49-F238E27FC236}">
-                <a16:creationId xmlns:a16="http://schemas.microsoft.com/office/drawing/2014/main" id="{F7C0AAE1-189A-4EBE-98A7-CD7855CBC065}"/>
-              </a:ext>
-            </a:extLst>
-          </p:cNvPr>
-          <p:cNvSpPr>
-            <a:spLocks noGrp="1"/>
-          </p:cNvSpPr>
-          <p:nvPr>
-            <p:ph idx="1"/>
-          </p:nvPr>
-        </p:nvSpPr>
-        <p:spPr/>
-        <p:txBody>
-          <a:bodyPr/>
-          <a:lstStyle/>
-          <a:p>
-            <a:r>
-              <a:rPr lang="en-US" sz="3200" dirty="0"/>
-              <a:t>Build Arm</a:t>
-            </a:r>
-          </a:p>
-          <a:p>
-            <a:r>
-              <a:rPr lang="en-US" sz="3200" dirty="0"/>
-              <a:t>Flash a mini 32bit Java Virtual Machine onto Lego NXT Device </a:t>
-            </a:r>
-          </a:p>
-          <a:p>
-            <a:r>
-              <a:rPr lang="en-US" sz="3200" dirty="0"/>
-              <a:t>Download 32bit version of Java 8 and Eclipse</a:t>
-            </a:r>
-          </a:p>
-          <a:p>
-            <a:r>
-              <a:rPr lang="en-US" sz="3200" dirty="0"/>
-              <a:t>Download and Install </a:t>
-            </a:r>
-            <a:r>
-              <a:rPr lang="en-US" sz="3200" dirty="0" err="1"/>
-              <a:t>Lejos</a:t>
-            </a:r>
-            <a:r>
-              <a:rPr lang="en-US" sz="3200" dirty="0"/>
-              <a:t> Eclipse extension</a:t>
-            </a:r>
-          </a:p>
-          <a:p>
-            <a:endParaRPr lang="en-IE" dirty="0"/>
-          </a:p>
-        </p:txBody>
-      </p:sp>
+          </a:blip>
+          <a:stretch>
+            <a:fillRect/>
+          </a:stretch>
+        </p:blipFill>
+        <p:spPr>
+          <a:xfrm>
+            <a:off x="977900" y="1447800"/>
+            <a:ext cx="10058400" cy="3898410"/>
+          </a:xfrm>
+          <a:prstGeom prst="rect">
+            <a:avLst/>
+          </a:prstGeom>
+        </p:spPr>
+      </p:pic>
     </p:spTree>
     <p:extLst>
       <p:ext uri="{BB962C8B-B14F-4D97-AF65-F5344CB8AC3E}">
-        <p14:creationId xmlns:p14="http://schemas.microsoft.com/office/powerpoint/2010/main" val="1419579602"/>
+        <p14:creationId xmlns:p14="http://schemas.microsoft.com/office/powerpoint/2010/main" val="1554098085"/>
       </p:ext>
     </p:extLst>
   </p:cSld>
@@ -6446,7 +6407,7 @@
           <p:cNvPr id="2" name="Title 1">
             <a:extLst>
               <a:ext uri="{FF2B5EF4-FFF2-40B4-BE49-F238E27FC236}">
-                <a16:creationId xmlns:a16="http://schemas.microsoft.com/office/drawing/2014/main" id="{1A2CB77B-56FF-484E-8A7D-0B1F5C008472}"/>
+                <a16:creationId xmlns:a16="http://schemas.microsoft.com/office/drawing/2014/main" xmlns="" id="{102572C9-9C34-4253-8C28-01233DB3741E}"/>
               </a:ext>
             </a:extLst>
           </p:cNvPr>
@@ -6463,10 +6424,14 @@
           <a:lstStyle/>
           <a:p>
             <a:r>
-              <a:rPr lang="en-US" sz="6000" dirty="0"/>
-              <a:t>Leap Motion Gestures</a:t>
-            </a:r>
-            <a:endParaRPr lang="en-IE" sz="6000" dirty="0"/>
+              <a:rPr lang="en-IE" dirty="0"/>
+              <a:t>Mechanical</a:t>
+            </a:r>
+            <a:r>
+              <a:rPr lang="en-US" dirty="0"/>
+              <a:t> Arm Setup</a:t>
+            </a:r>
+            <a:endParaRPr lang="en-IE" dirty="0"/>
           </a:p>
         </p:txBody>
       </p:sp>
@@ -6475,7 +6440,7 @@
           <p:cNvPr id="3" name="Content Placeholder 2">
             <a:extLst>
               <a:ext uri="{FF2B5EF4-FFF2-40B4-BE49-F238E27FC236}">
-                <a16:creationId xmlns:a16="http://schemas.microsoft.com/office/drawing/2014/main" id="{9442773B-9360-4357-800A-4B9495141E3A}"/>
+                <a16:creationId xmlns:a16="http://schemas.microsoft.com/office/drawing/2014/main" xmlns="" id="{F7C0AAE1-189A-4EBE-98A7-CD7855CBC065}"/>
               </a:ext>
             </a:extLst>
           </p:cNvPr>
@@ -6486,85 +6451,40 @@
             <p:ph idx="1"/>
           </p:nvPr>
         </p:nvSpPr>
-        <p:spPr>
-          <a:xfrm>
-            <a:off x="531418" y="1853248"/>
-            <a:ext cx="12150775" cy="4195481"/>
-          </a:xfrm>
-        </p:spPr>
-        <p:txBody>
-          <a:bodyPr>
-            <a:normAutofit/>
-          </a:bodyPr>
-          <a:lstStyle/>
-          <a:p>
-            <a:r>
-              <a:rPr lang="en-US" sz="3600" dirty="0">
-                <a:solidFill>
-                  <a:srgbClr val="FF0000"/>
-                </a:solidFill>
-              </a:rPr>
-              <a:t>Right Hand Closed Fist </a:t>
-            </a:r>
-            <a:r>
-              <a:rPr lang="en-US" sz="3600" dirty="0"/>
-              <a:t>– Close Claw</a:t>
-            </a:r>
-          </a:p>
-          <a:p>
-            <a:r>
-              <a:rPr lang="en-US" sz="3600" dirty="0">
-                <a:solidFill>
-                  <a:srgbClr val="FF0000"/>
-                </a:solidFill>
-              </a:rPr>
-              <a:t>Right Hand Upside down Closed Fist </a:t>
-            </a:r>
-            <a:r>
-              <a:rPr lang="en-US" sz="3600" dirty="0"/>
-              <a:t>– Open Claw</a:t>
-            </a:r>
-          </a:p>
-          <a:p>
-            <a:r>
-              <a:rPr lang="en-US" sz="3600" dirty="0">
-                <a:solidFill>
-                  <a:srgbClr val="FF0000"/>
-                </a:solidFill>
-              </a:rPr>
-              <a:t>Left Hand Finger Circle </a:t>
-            </a:r>
-            <a:r>
-              <a:rPr lang="en-US" sz="3600" dirty="0"/>
-              <a:t>– Rotate Arm Base</a:t>
-            </a:r>
-          </a:p>
-          <a:p>
-            <a:r>
-              <a:rPr lang="en-US" sz="3600" dirty="0">
-                <a:solidFill>
-                  <a:srgbClr val="FF0000"/>
-                </a:solidFill>
-              </a:rPr>
-              <a:t>Left Hand Index Finger Tap </a:t>
-            </a:r>
-            <a:r>
-              <a:rPr lang="en-US" sz="3600" dirty="0"/>
-              <a:t>– Rise Arm</a:t>
-            </a:r>
-          </a:p>
-          <a:p>
-            <a:r>
-              <a:rPr lang="en-US" sz="3600" dirty="0">
-                <a:solidFill>
-                  <a:srgbClr val="FF0000"/>
-                </a:solidFill>
-              </a:rPr>
-              <a:t>Left Hand Middle Finger Tap </a:t>
-            </a:r>
-            <a:r>
-              <a:rPr lang="en-US" sz="3600" dirty="0"/>
-              <a:t>– Lower Arm</a:t>
+        <p:spPr/>
+        <p:txBody>
+          <a:bodyPr/>
+          <a:lstStyle/>
+          <a:p>
+            <a:r>
+              <a:rPr lang="en-US" sz="3200" dirty="0"/>
+              <a:t>Build Arm</a:t>
+            </a:r>
+          </a:p>
+          <a:p>
+            <a:r>
+              <a:rPr lang="en-US" sz="3200" dirty="0"/>
+              <a:t>Flash a mini 32bit Java Virtual Machine onto Lego NXT Device </a:t>
+            </a:r>
+          </a:p>
+          <a:p>
+            <a:r>
+              <a:rPr lang="en-US" sz="3200" dirty="0"/>
+              <a:t>Download 32bit version of Java 8 and Eclipse</a:t>
+            </a:r>
+          </a:p>
+          <a:p>
+            <a:r>
+              <a:rPr lang="en-US" sz="3200" dirty="0"/>
+              <a:t>Download and Install </a:t>
+            </a:r>
+            <a:r>
+              <a:rPr lang="en-US" sz="3200" dirty="0" err="1"/>
+              <a:t>Lejos</a:t>
+            </a:r>
+            <a:r>
+              <a:rPr lang="en-US" sz="3200" dirty="0"/>
+              <a:t> Eclipse extension</a:t>
             </a:r>
           </a:p>
           <a:p>
@@ -6575,7 +6495,7 @@
     </p:spTree>
     <p:extLst>
       <p:ext uri="{BB962C8B-B14F-4D97-AF65-F5344CB8AC3E}">
-        <p14:creationId xmlns:p14="http://schemas.microsoft.com/office/powerpoint/2010/main" val="1918306171"/>
+        <p14:creationId xmlns:p14="http://schemas.microsoft.com/office/powerpoint/2010/main" val="1419579602"/>
       </p:ext>
     </p:extLst>
   </p:cSld>
@@ -6607,7 +6527,7 @@
           <p:cNvPr id="2" name="Title 1">
             <a:extLst>
               <a:ext uri="{FF2B5EF4-FFF2-40B4-BE49-F238E27FC236}">
-                <a16:creationId xmlns:a16="http://schemas.microsoft.com/office/drawing/2014/main" id="{29B2CD78-BDF2-4BBB-A5B3-EE8F1804A3DD}"/>
+                <a16:creationId xmlns:a16="http://schemas.microsoft.com/office/drawing/2014/main" xmlns="" id="{1A2CB77B-56FF-484E-8A7D-0B1F5C008472}"/>
               </a:ext>
             </a:extLst>
           </p:cNvPr>
@@ -6618,28 +6538,125 @@
             <p:ph type="title"/>
           </p:nvPr>
         </p:nvSpPr>
+        <p:spPr/>
+        <p:txBody>
+          <a:bodyPr/>
+          <a:lstStyle/>
+          <a:p>
+            <a:r>
+              <a:rPr lang="en-US" sz="6000" dirty="0"/>
+              <a:t>Leap Motion Gestures</a:t>
+            </a:r>
+            <a:endParaRPr lang="en-IE" sz="6000" dirty="0"/>
+          </a:p>
+        </p:txBody>
+      </p:sp>
+      <p:sp>
+        <p:nvSpPr>
+          <p:cNvPr id="3" name="Content Placeholder 2">
+            <a:extLst>
+              <a:ext uri="{FF2B5EF4-FFF2-40B4-BE49-F238E27FC236}">
+                <a16:creationId xmlns:a16="http://schemas.microsoft.com/office/drawing/2014/main" xmlns="" id="{9442773B-9360-4357-800A-4B9495141E3A}"/>
+              </a:ext>
+            </a:extLst>
+          </p:cNvPr>
+          <p:cNvSpPr>
+            <a:spLocks noGrp="1"/>
+          </p:cNvSpPr>
+          <p:nvPr>
+            <p:ph idx="1"/>
+          </p:nvPr>
+        </p:nvSpPr>
         <p:spPr>
           <a:xfrm>
-            <a:off x="2946251" y="2941395"/>
-            <a:ext cx="9404723" cy="1400530"/>
+            <a:off x="531418" y="1853248"/>
+            <a:ext cx="12150775" cy="4195481"/>
           </a:xfrm>
         </p:spPr>
         <p:txBody>
-          <a:bodyPr/>
-          <a:lstStyle/>
-          <a:p>
-            <a:r>
-              <a:rPr lang="en-US" sz="6000" dirty="0"/>
-              <a:t>Live Presentation</a:t>
-            </a:r>
-            <a:endParaRPr lang="en-IE" sz="6000" dirty="0"/>
+          <a:bodyPr>
+            <a:normAutofit/>
+          </a:bodyPr>
+          <a:lstStyle/>
+          <a:p>
+            <a:r>
+              <a:rPr lang="en-US" sz="3600" dirty="0">
+                <a:solidFill>
+                  <a:srgbClr val="FF0000"/>
+                </a:solidFill>
+              </a:rPr>
+              <a:t>Right Hand Closed Fist </a:t>
+            </a:r>
+            <a:r>
+              <a:rPr lang="en-US" sz="3600" dirty="0"/>
+              <a:t>– Close Claw</a:t>
+            </a:r>
+          </a:p>
+          <a:p>
+            <a:r>
+              <a:rPr lang="en-US" sz="3600" dirty="0">
+                <a:solidFill>
+                  <a:srgbClr val="FF0000"/>
+                </a:solidFill>
+              </a:rPr>
+              <a:t>Right Hand Upside down Closed Fist </a:t>
+            </a:r>
+            <a:r>
+              <a:rPr lang="en-US" sz="3600" dirty="0"/>
+              <a:t>– Open Claw</a:t>
+            </a:r>
+          </a:p>
+          <a:p>
+            <a:r>
+              <a:rPr lang="en-US" sz="3600" dirty="0">
+                <a:solidFill>
+                  <a:srgbClr val="FF0000"/>
+                </a:solidFill>
+              </a:rPr>
+              <a:t>Left Hand Finger Circle </a:t>
+            </a:r>
+            <a:r>
+              <a:rPr lang="en-US" sz="3600" dirty="0"/>
+              <a:t>– Rotate Arm Base</a:t>
+            </a:r>
+          </a:p>
+          <a:p>
+            <a:r>
+              <a:rPr lang="en-US" sz="3600" dirty="0">
+                <a:solidFill>
+                  <a:srgbClr val="FF0000"/>
+                </a:solidFill>
+              </a:rPr>
+              <a:t>Left Hand Index Finger Tap </a:t>
+            </a:r>
+            <a:r>
+              <a:rPr lang="en-US" sz="3600" dirty="0"/>
+              <a:t>– Rise Arm</a:t>
+            </a:r>
+          </a:p>
+          <a:p>
+            <a:r>
+              <a:rPr lang="en-US" sz="3600" dirty="0">
+                <a:solidFill>
+                  <a:srgbClr val="FF0000"/>
+                </a:solidFill>
+              </a:rPr>
+              <a:t>Left Hand Middle Finger Tap </a:t>
+            </a:r>
+            <a:r>
+              <a:rPr lang="en-US" sz="3600" dirty="0"/>
+              <a:t>– Lower Arm</a:t>
+            </a:r>
+          </a:p>
+          <a:p>
+            <a:endParaRPr lang="en-IE" dirty="0"/>
           </a:p>
         </p:txBody>
       </p:sp>
     </p:spTree>
     <p:extLst>
       <p:ext uri="{BB962C8B-B14F-4D97-AF65-F5344CB8AC3E}">
-        <p14:creationId xmlns:p14="http://schemas.microsoft.com/office/powerpoint/2010/main" val="151178072"/>
+        <p14:creationId xmlns:p14="http://schemas.microsoft.com/office/powerpoint/2010/main" val="1918306171"/>
       </p:ext>
     </p:extLst>
   </p:cSld>
@@ -6671,7 +6688,71 @@
           <p:cNvPr id="2" name="Title 1">
             <a:extLst>
               <a:ext uri="{FF2B5EF4-FFF2-40B4-BE49-F238E27FC236}">
-                <a16:creationId xmlns:a16="http://schemas.microsoft.com/office/drawing/2014/main" id="{DAA10059-0CAB-4820-B48F-18D2FE58784A}"/>
+                <a16:creationId xmlns:a16="http://schemas.microsoft.com/office/drawing/2014/main" xmlns="" id="{29B2CD78-BDF2-4BBB-A5B3-EE8F1804A3DD}"/>
+              </a:ext>
+            </a:extLst>
+          </p:cNvPr>
+          <p:cNvSpPr>
+            <a:spLocks noGrp="1"/>
+          </p:cNvSpPr>
+          <p:nvPr>
+            <p:ph type="title"/>
+          </p:nvPr>
+        </p:nvSpPr>
+        <p:spPr>
+          <a:xfrm>
+            <a:off x="2946251" y="2941395"/>
+            <a:ext cx="9404723" cy="1400530"/>
+          </a:xfrm>
+        </p:spPr>
+        <p:txBody>
+          <a:bodyPr/>
+          <a:lstStyle/>
+          <a:p>
+            <a:r>
+              <a:rPr lang="en-US" sz="6000" dirty="0"/>
+              <a:t>Live Presentation</a:t>
+            </a:r>
+            <a:endParaRPr lang="en-IE" sz="6000" dirty="0"/>
+          </a:p>
+        </p:txBody>
+      </p:sp>
+    </p:spTree>
+    <p:extLst>
+      <p:ext uri="{BB962C8B-B14F-4D97-AF65-F5344CB8AC3E}">
+        <p14:creationId xmlns:p14="http://schemas.microsoft.com/office/powerpoint/2010/main" val="151178072"/>
+      </p:ext>
+    </p:extLst>
+  </p:cSld>
+  <p:clrMapOvr>
+    <a:masterClrMapping/>
+  </p:clrMapOvr>
+</p:sld>
+</file>
+
+<file path=ppt/slides/slide8.xml><?xml version="1.0" encoding="utf-8"?>
+<p:sld xmlns:a="http://schemas.openxmlformats.org/drawingml/2006/main" xmlns:r="http://schemas.openxmlformats.org/officeDocument/2006/relationships" xmlns:p="http://schemas.openxmlformats.org/presentationml/2006/main">
+  <p:cSld>
+    <p:spTree>
+      <p:nvGrpSpPr>
+        <p:cNvPr id="1" name=""/>
+        <p:cNvGrpSpPr/>
+        <p:nvPr/>
+      </p:nvGrpSpPr>
+      <p:grpSpPr>
+        <a:xfrm>
+          <a:off x="0" y="0"/>
+          <a:ext cx="0" cy="0"/>
+          <a:chOff x="0" y="0"/>
+          <a:chExt cx="0" cy="0"/>
+        </a:xfrm>
+      </p:grpSpPr>
+      <p:sp>
+        <p:nvSpPr>
+          <p:cNvPr id="2" name="Title 1">
+            <a:extLst>
+              <a:ext uri="{FF2B5EF4-FFF2-40B4-BE49-F238E27FC236}">
+                <a16:creationId xmlns:a16="http://schemas.microsoft.com/office/drawing/2014/main" xmlns="" id="{DAA10059-0CAB-4820-B48F-18D2FE58784A}"/>
               </a:ext>
             </a:extLst>
           </p:cNvPr>

</xml_diff>

<commit_message>
added word document to repository
</commit_message>
<xml_diff>
--- a/presentation.pptx
+++ b/presentation.pptx
@@ -305,7 +305,7 @@
           <a:p>
             <a:fld id="{4AAD347D-5ACD-4C99-B74B-A9C85AD731AF}" type="datetimeFigureOut">
               <a:rPr lang="en-US" dirty="0"/>
-              <a:t>4/4/2019</a:t>
+              <a:t>4/5/2019</a:t>
             </a:fld>
             <a:endParaRPr lang="en-US" dirty="0"/>
           </a:p>
@@ -575,7 +575,7 @@
           <a:p>
             <a:fld id="{4509A250-FF31-4206-8172-F9D3106AACB1}" type="datetimeFigureOut">
               <a:rPr lang="en-US" dirty="0"/>
-              <a:t>4/4/2019</a:t>
+              <a:t>4/5/2019</a:t>
             </a:fld>
             <a:endParaRPr lang="en-US" dirty="0"/>
           </a:p>
@@ -764,7 +764,7 @@
           <a:p>
             <a:fld id="{4509A250-FF31-4206-8172-F9D3106AACB1}" type="datetimeFigureOut">
               <a:rPr lang="en-US" dirty="0"/>
-              <a:t>4/4/2019</a:t>
+              <a:t>4/5/2019</a:t>
             </a:fld>
             <a:endParaRPr lang="en-US" dirty="0"/>
           </a:p>
@@ -1032,7 +1032,7 @@
           <a:p>
             <a:fld id="{4509A250-FF31-4206-8172-F9D3106AACB1}" type="datetimeFigureOut">
               <a:rPr lang="en-US" dirty="0"/>
-              <a:t>4/4/2019</a:t>
+              <a:t>4/5/2019</a:t>
             </a:fld>
             <a:endParaRPr lang="en-US" dirty="0"/>
           </a:p>
@@ -1368,7 +1368,7 @@
           <a:p>
             <a:fld id="{4509A250-FF31-4206-8172-F9D3106AACB1}" type="datetimeFigureOut">
               <a:rPr lang="en-US" dirty="0"/>
-              <a:t>4/4/2019</a:t>
+              <a:t>4/5/2019</a:t>
             </a:fld>
             <a:endParaRPr lang="en-US" dirty="0"/>
           </a:p>
@@ -1986,7 +1986,7 @@
           <a:p>
             <a:fld id="{4509A250-FF31-4206-8172-F9D3106AACB1}" type="datetimeFigureOut">
               <a:rPr lang="en-US" dirty="0"/>
-              <a:t>4/4/2019</a:t>
+              <a:t>4/5/2019</a:t>
             </a:fld>
             <a:endParaRPr lang="en-US" dirty="0"/>
           </a:p>
@@ -2841,7 +2841,7 @@
           <a:p>
             <a:fld id="{4509A250-FF31-4206-8172-F9D3106AACB1}" type="datetimeFigureOut">
               <a:rPr lang="en-US" dirty="0"/>
-              <a:t>4/4/2019</a:t>
+              <a:t>4/5/2019</a:t>
             </a:fld>
             <a:endParaRPr lang="en-US" dirty="0"/>
           </a:p>
@@ -3006,7 +3006,7 @@
           <a:p>
             <a:fld id="{4509A250-FF31-4206-8172-F9D3106AACB1}" type="datetimeFigureOut">
               <a:rPr lang="en-US" dirty="0"/>
-              <a:t>4/4/2019</a:t>
+              <a:t>4/5/2019</a:t>
             </a:fld>
             <a:endParaRPr lang="en-US" dirty="0"/>
           </a:p>
@@ -3181,7 +3181,7 @@
           <a:p>
             <a:fld id="{4509A250-FF31-4206-8172-F9D3106AACB1}" type="datetimeFigureOut">
               <a:rPr lang="en-US" dirty="0"/>
-              <a:t>4/4/2019</a:t>
+              <a:t>4/5/2019</a:t>
             </a:fld>
             <a:endParaRPr lang="en-US" dirty="0"/>
           </a:p>
@@ -3346,7 +3346,7 @@
           <a:p>
             <a:fld id="{4509A250-FF31-4206-8172-F9D3106AACB1}" type="datetimeFigureOut">
               <a:rPr lang="en-US" dirty="0"/>
-              <a:t>4/4/2019</a:t>
+              <a:t>4/5/2019</a:t>
             </a:fld>
             <a:endParaRPr lang="en-US" dirty="0"/>
           </a:p>
@@ -3588,7 +3588,7 @@
           <a:p>
             <a:fld id="{9796027F-7875-4030-9381-8BD8C4F21935}" type="datetimeFigureOut">
               <a:rPr lang="en-US" dirty="0"/>
-              <a:t>4/4/2019</a:t>
+              <a:t>4/5/2019</a:t>
             </a:fld>
             <a:endParaRPr lang="en-US" dirty="0"/>
           </a:p>
@@ -3875,7 +3875,7 @@
           <a:p>
             <a:fld id="{9796027F-7875-4030-9381-8BD8C4F21935}" type="datetimeFigureOut">
               <a:rPr lang="en-US" dirty="0"/>
-              <a:t>4/4/2019</a:t>
+              <a:t>4/5/2019</a:t>
             </a:fld>
             <a:endParaRPr lang="en-US" dirty="0"/>
           </a:p>
@@ -4314,7 +4314,7 @@
           <a:p>
             <a:fld id="{9796027F-7875-4030-9381-8BD8C4F21935}" type="datetimeFigureOut">
               <a:rPr lang="en-US" dirty="0"/>
-              <a:t>4/4/2019</a:t>
+              <a:t>4/5/2019</a:t>
             </a:fld>
             <a:endParaRPr lang="en-US" dirty="0"/>
           </a:p>
@@ -4427,7 +4427,7 @@
           <a:p>
             <a:fld id="{4509A250-FF31-4206-8172-F9D3106AACB1}" type="datetimeFigureOut">
               <a:rPr lang="en-US" dirty="0"/>
-              <a:t>4/4/2019</a:t>
+              <a:t>4/5/2019</a:t>
             </a:fld>
             <a:endParaRPr lang="en-US" dirty="0"/>
           </a:p>
@@ -4517,7 +4517,7 @@
           <a:p>
             <a:fld id="{4509A250-FF31-4206-8172-F9D3106AACB1}" type="datetimeFigureOut">
               <a:rPr lang="en-US" dirty="0"/>
-              <a:t>4/4/2019</a:t>
+              <a:t>4/5/2019</a:t>
             </a:fld>
             <a:endParaRPr lang="en-US" dirty="0"/>
           </a:p>
@@ -4791,7 +4791,7 @@
           <a:p>
             <a:fld id="{4509A250-FF31-4206-8172-F9D3106AACB1}" type="datetimeFigureOut">
               <a:rPr lang="en-US" dirty="0"/>
-              <a:t>4/4/2019</a:t>
+              <a:t>4/5/2019</a:t>
             </a:fld>
             <a:endParaRPr lang="en-US" dirty="0"/>
           </a:p>
@@ -5061,7 +5061,7 @@
           <a:p>
             <a:fld id="{4509A250-FF31-4206-8172-F9D3106AACB1}" type="datetimeFigureOut">
               <a:rPr lang="en-US" dirty="0"/>
-              <a:t>4/4/2019</a:t>
+              <a:t>4/5/2019</a:t>
             </a:fld>
             <a:endParaRPr lang="en-US" dirty="0"/>
           </a:p>
@@ -5485,7 +5485,7 @@
           <a:p>
             <a:fld id="{4AAD347D-5ACD-4C99-B74B-A9C85AD731AF}" type="datetimeFigureOut">
               <a:rPr lang="en-US" dirty="0"/>
-              <a:t>4/4/2019</a:t>
+              <a:t>4/5/2019</a:t>
             </a:fld>
             <a:endParaRPr lang="en-US" dirty="0"/>
           </a:p>
@@ -6262,17 +6262,20 @@
         <p:spPr/>
         <p:txBody>
           <a:bodyPr>
-            <a:normAutofit/>
+            <a:normAutofit lnSpcReduction="10000"/>
           </a:bodyPr>
           <a:lstStyle/>
           <a:p>
+            <a:r>
+              <a:rPr lang="en-US" sz="4000" dirty="0"/>
+              <a:t>Java 8</a:t>
+            </a:r>
+          </a:p>
+          <a:p>
             <a:pPr marL="0" indent="0">
               <a:buNone/>
             </a:pPr>
-            <a:r>
-              <a:rPr lang="en-US" sz="4000" dirty="0"/>
-              <a:t>Java 8 64bit and 32bit</a:t>
-            </a:r>
+            <a:endParaRPr lang="en-US" sz="4000" dirty="0"/>
           </a:p>
           <a:p>
             <a:r>

</xml_diff>